<commit_message>
Chap03: End of pictures
</commit_message>
<xml_diff>
--- a/03-h-Mn/Pictures/PumpBPw.pptx
+++ b/03-h-Mn/Pictures/PumpBPw.pptx
@@ -192,7 +192,7 @@
           <a:p>
             <a:fld id="{A732596A-CC33-44AB-A517-CD91BCF05E15}" type="datetimeFigureOut">
               <a:rPr lang="en-US" smtClean="0"/>
-              <a:t>7/11/2017</a:t>
+              <a:t>7/13/2017</a:t>
             </a:fld>
             <a:endParaRPr lang="en-US"/>
           </a:p>
@@ -641,7 +641,7 @@
           <a:p>
             <a:fld id="{252CF840-51FB-49D9-ADDC-0C52DA34DC77}" type="datetimeFigureOut">
               <a:rPr lang="en-US" smtClean="0"/>
-              <a:t>7/11/2017</a:t>
+              <a:t>7/13/2017</a:t>
             </a:fld>
             <a:endParaRPr lang="en-US"/>
           </a:p>
@@ -811,7 +811,7 @@
           <a:p>
             <a:fld id="{252CF840-51FB-49D9-ADDC-0C52DA34DC77}" type="datetimeFigureOut">
               <a:rPr lang="en-US" smtClean="0"/>
-              <a:t>7/11/2017</a:t>
+              <a:t>7/13/2017</a:t>
             </a:fld>
             <a:endParaRPr lang="en-US"/>
           </a:p>
@@ -991,7 +991,7 @@
           <a:p>
             <a:fld id="{252CF840-51FB-49D9-ADDC-0C52DA34DC77}" type="datetimeFigureOut">
               <a:rPr lang="en-US" smtClean="0"/>
-              <a:t>7/11/2017</a:t>
+              <a:t>7/13/2017</a:t>
             </a:fld>
             <a:endParaRPr lang="en-US"/>
           </a:p>
@@ -1161,7 +1161,7 @@
           <a:p>
             <a:fld id="{252CF840-51FB-49D9-ADDC-0C52DA34DC77}" type="datetimeFigureOut">
               <a:rPr lang="en-US" smtClean="0"/>
-              <a:t>7/11/2017</a:t>
+              <a:t>7/13/2017</a:t>
             </a:fld>
             <a:endParaRPr lang="en-US"/>
           </a:p>
@@ -1407,7 +1407,7 @@
           <a:p>
             <a:fld id="{252CF840-51FB-49D9-ADDC-0C52DA34DC77}" type="datetimeFigureOut">
               <a:rPr lang="en-US" smtClean="0"/>
-              <a:t>7/11/2017</a:t>
+              <a:t>7/13/2017</a:t>
             </a:fld>
             <a:endParaRPr lang="en-US"/>
           </a:p>
@@ -1695,7 +1695,7 @@
           <a:p>
             <a:fld id="{252CF840-51FB-49D9-ADDC-0C52DA34DC77}" type="datetimeFigureOut">
               <a:rPr lang="en-US" smtClean="0"/>
-              <a:t>7/11/2017</a:t>
+              <a:t>7/13/2017</a:t>
             </a:fld>
             <a:endParaRPr lang="en-US"/>
           </a:p>
@@ -2117,7 +2117,7 @@
           <a:p>
             <a:fld id="{252CF840-51FB-49D9-ADDC-0C52DA34DC77}" type="datetimeFigureOut">
               <a:rPr lang="en-US" smtClean="0"/>
-              <a:t>7/11/2017</a:t>
+              <a:t>7/13/2017</a:t>
             </a:fld>
             <a:endParaRPr lang="en-US"/>
           </a:p>
@@ -2235,7 +2235,7 @@
           <a:p>
             <a:fld id="{252CF840-51FB-49D9-ADDC-0C52DA34DC77}" type="datetimeFigureOut">
               <a:rPr lang="en-US" smtClean="0"/>
-              <a:t>7/11/2017</a:t>
+              <a:t>7/13/2017</a:t>
             </a:fld>
             <a:endParaRPr lang="en-US"/>
           </a:p>
@@ -2330,7 +2330,7 @@
           <a:p>
             <a:fld id="{252CF840-51FB-49D9-ADDC-0C52DA34DC77}" type="datetimeFigureOut">
               <a:rPr lang="en-US" smtClean="0"/>
-              <a:t>7/11/2017</a:t>
+              <a:t>7/13/2017</a:t>
             </a:fld>
             <a:endParaRPr lang="en-US"/>
           </a:p>
@@ -2607,7 +2607,7 @@
           <a:p>
             <a:fld id="{252CF840-51FB-49D9-ADDC-0C52DA34DC77}" type="datetimeFigureOut">
               <a:rPr lang="en-US" smtClean="0"/>
-              <a:t>7/11/2017</a:t>
+              <a:t>7/13/2017</a:t>
             </a:fld>
             <a:endParaRPr lang="en-US"/>
           </a:p>
@@ -2860,7 +2860,7 @@
           <a:p>
             <a:fld id="{252CF840-51FB-49D9-ADDC-0C52DA34DC77}" type="datetimeFigureOut">
               <a:rPr lang="en-US" smtClean="0"/>
-              <a:t>7/11/2017</a:t>
+              <a:t>7/13/2017</a:t>
             </a:fld>
             <a:endParaRPr lang="en-US"/>
           </a:p>
@@ -3073,7 +3073,7 @@
           <a:p>
             <a:fld id="{252CF840-51FB-49D9-ADDC-0C52DA34DC77}" type="datetimeFigureOut">
               <a:rPr lang="en-US" smtClean="0"/>
-              <a:t>7/11/2017</a:t>
+              <a:t>7/13/2017</a:t>
             </a:fld>
             <a:endParaRPr lang="en-US"/>
           </a:p>
@@ -3450,27 +3450,29 @@
       </p:grpSpPr>
       <p:pic>
         <p:nvPicPr>
-          <p:cNvPr id="17" name="Picture 5"/>
+          <p:cNvPr id="1027" name="Picture 3"/>
           <p:cNvPicPr>
             <a:picLocks noChangeAspect="1" noChangeArrowheads="1"/>
           </p:cNvPicPr>
           <p:nvPr/>
         </p:nvPicPr>
-        <p:blipFill rotWithShape="1">
-          <a:blip r:embed="rId2" cstate="print">
+        <p:blipFill>
+          <a:blip r:embed="rId2">
             <a:extLst>
               <a:ext uri="{28A0092B-C50C-407E-A947-70E740481C1C}">
                 <a14:useLocalDpi xmlns:a14="http://schemas.microsoft.com/office/drawing/2010/main" val="0"/>
               </a:ext>
             </a:extLst>
           </a:blip>
-          <a:srcRect t="1976" r="5973" b="1439"/>
-          <a:stretch/>
+          <a:srcRect/>
+          <a:stretch>
+            <a:fillRect/>
+          </a:stretch>
         </p:blipFill>
         <p:spPr bwMode="auto">
           <a:xfrm>
-            <a:off x="2974429" y="0"/>
-            <a:ext cx="3550915" cy="6311974"/>
+            <a:off x="2986438" y="-129600"/>
+            <a:ext cx="3782041" cy="6544800"/>
           </a:xfrm>
           <a:prstGeom prst="rect">
             <a:avLst/>

</xml_diff>

<commit_message>
Defense finished. Looked back tonight before sending
</commit_message>
<xml_diff>
--- a/03-h-Mn/Pictures/PumpBPw.pptx
+++ b/03-h-Mn/Pictures/PumpBPw.pptx
@@ -192,7 +192,7 @@
           <a:p>
             <a:fld id="{A732596A-CC33-44AB-A517-CD91BCF05E15}" type="datetimeFigureOut">
               <a:rPr lang="en-US" smtClean="0"/>
-              <a:t>7/13/2017</a:t>
+              <a:t>11/16/2017</a:t>
             </a:fld>
             <a:endParaRPr lang="en-US"/>
           </a:p>
@@ -641,7 +641,7 @@
           <a:p>
             <a:fld id="{252CF840-51FB-49D9-ADDC-0C52DA34DC77}" type="datetimeFigureOut">
               <a:rPr lang="en-US" smtClean="0"/>
-              <a:t>7/13/2017</a:t>
+              <a:t>11/16/2017</a:t>
             </a:fld>
             <a:endParaRPr lang="en-US"/>
           </a:p>
@@ -811,7 +811,7 @@
           <a:p>
             <a:fld id="{252CF840-51FB-49D9-ADDC-0C52DA34DC77}" type="datetimeFigureOut">
               <a:rPr lang="en-US" smtClean="0"/>
-              <a:t>7/13/2017</a:t>
+              <a:t>11/16/2017</a:t>
             </a:fld>
             <a:endParaRPr lang="en-US"/>
           </a:p>
@@ -991,7 +991,7 @@
           <a:p>
             <a:fld id="{252CF840-51FB-49D9-ADDC-0C52DA34DC77}" type="datetimeFigureOut">
               <a:rPr lang="en-US" smtClean="0"/>
-              <a:t>7/13/2017</a:t>
+              <a:t>11/16/2017</a:t>
             </a:fld>
             <a:endParaRPr lang="en-US"/>
           </a:p>
@@ -1161,7 +1161,7 @@
           <a:p>
             <a:fld id="{252CF840-51FB-49D9-ADDC-0C52DA34DC77}" type="datetimeFigureOut">
               <a:rPr lang="en-US" smtClean="0"/>
-              <a:t>7/13/2017</a:t>
+              <a:t>11/16/2017</a:t>
             </a:fld>
             <a:endParaRPr lang="en-US"/>
           </a:p>
@@ -1407,7 +1407,7 @@
           <a:p>
             <a:fld id="{252CF840-51FB-49D9-ADDC-0C52DA34DC77}" type="datetimeFigureOut">
               <a:rPr lang="en-US" smtClean="0"/>
-              <a:t>7/13/2017</a:t>
+              <a:t>11/16/2017</a:t>
             </a:fld>
             <a:endParaRPr lang="en-US"/>
           </a:p>
@@ -1695,7 +1695,7 @@
           <a:p>
             <a:fld id="{252CF840-51FB-49D9-ADDC-0C52DA34DC77}" type="datetimeFigureOut">
               <a:rPr lang="en-US" smtClean="0"/>
-              <a:t>7/13/2017</a:t>
+              <a:t>11/16/2017</a:t>
             </a:fld>
             <a:endParaRPr lang="en-US"/>
           </a:p>
@@ -2117,7 +2117,7 @@
           <a:p>
             <a:fld id="{252CF840-51FB-49D9-ADDC-0C52DA34DC77}" type="datetimeFigureOut">
               <a:rPr lang="en-US" smtClean="0"/>
-              <a:t>7/13/2017</a:t>
+              <a:t>11/16/2017</a:t>
             </a:fld>
             <a:endParaRPr lang="en-US"/>
           </a:p>
@@ -2235,7 +2235,7 @@
           <a:p>
             <a:fld id="{252CF840-51FB-49D9-ADDC-0C52DA34DC77}" type="datetimeFigureOut">
               <a:rPr lang="en-US" smtClean="0"/>
-              <a:t>7/13/2017</a:t>
+              <a:t>11/16/2017</a:t>
             </a:fld>
             <a:endParaRPr lang="en-US"/>
           </a:p>
@@ -2330,7 +2330,7 @@
           <a:p>
             <a:fld id="{252CF840-51FB-49D9-ADDC-0C52DA34DC77}" type="datetimeFigureOut">
               <a:rPr lang="en-US" smtClean="0"/>
-              <a:t>7/13/2017</a:t>
+              <a:t>11/16/2017</a:t>
             </a:fld>
             <a:endParaRPr lang="en-US"/>
           </a:p>
@@ -2607,7 +2607,7 @@
           <a:p>
             <a:fld id="{252CF840-51FB-49D9-ADDC-0C52DA34DC77}" type="datetimeFigureOut">
               <a:rPr lang="en-US" smtClean="0"/>
-              <a:t>7/13/2017</a:t>
+              <a:t>11/16/2017</a:t>
             </a:fld>
             <a:endParaRPr lang="en-US"/>
           </a:p>
@@ -2860,7 +2860,7 @@
           <a:p>
             <a:fld id="{252CF840-51FB-49D9-ADDC-0C52DA34DC77}" type="datetimeFigureOut">
               <a:rPr lang="en-US" smtClean="0"/>
-              <a:t>7/13/2017</a:t>
+              <a:t>11/16/2017</a:t>
             </a:fld>
             <a:endParaRPr lang="en-US"/>
           </a:p>
@@ -3073,7 +3073,7 @@
           <a:p>
             <a:fld id="{252CF840-51FB-49D9-ADDC-0C52DA34DC77}" type="datetimeFigureOut">
               <a:rPr lang="en-US" smtClean="0"/>
-              <a:t>7/13/2017</a:t>
+              <a:t>11/16/2017</a:t>
             </a:fld>
             <a:endParaRPr lang="en-US"/>
           </a:p>
@@ -3450,7 +3450,7 @@
       </p:grpSpPr>
       <p:pic>
         <p:nvPicPr>
-          <p:cNvPr id="1027" name="Picture 3"/>
+          <p:cNvPr id="1026" name="Picture 2"/>
           <p:cNvPicPr>
             <a:picLocks noChangeAspect="1" noChangeArrowheads="1"/>
           </p:cNvPicPr>
@@ -3471,8 +3471,8 @@
         </p:blipFill>
         <p:spPr bwMode="auto">
           <a:xfrm>
-            <a:off x="2986438" y="-129600"/>
-            <a:ext cx="3782041" cy="6544800"/>
+            <a:off x="2988000" y="-129600"/>
+            <a:ext cx="3782042" cy="6544800"/>
           </a:xfrm>
           <a:prstGeom prst="rect">
             <a:avLst/>

</xml_diff>